<commit_message>
Changes due to resolved JIRA issues.
</commit_message>
<xml_diff>
--- a/images-source/drawings.pptx
+++ b/images-source/drawings.pptx
@@ -223,7 +223,7 @@
           <a:p>
             <a:fld id="{3D08445B-C90C-48FE-A35E-E6945CACA392}" type="datetimeFigureOut">
               <a:rPr lang="en-US" smtClean="0"/>
-              <a:t>7/20/2019</a:t>
+              <a:t>8/24/20</a:t>
             </a:fld>
             <a:endParaRPr lang="en-US" dirty="0"/>
           </a:p>
@@ -1135,10 +1135,9 @@
           <a:lstStyle/>
           <a:p>
             <a:r>
-              <a:rPr lang="en-US"/>
+              <a:rPr lang="en-US" dirty="0"/>
               <a:t>current</a:t>
             </a:r>
-            <a:endParaRPr lang="en-US" dirty="0"/>
           </a:p>
         </p:txBody>
       </p:sp>
@@ -1420,7 +1419,7 @@
                   <a:ea typeface="+mn-ea"/>
                   <a:cs typeface="+mn-cs"/>
                 </a:rPr>
-                <a:t>ASC X12N 278/275  (or portal for DDE)</a:t>
+                <a:t>ASC X12N 278/275  (or portal for Direct Data Entry)</a:t>
               </a:r>
             </a:p>
           </p:txBody>
@@ -7591,7 +7590,7 @@
                 <a:defRPr/>
               </a:pPr>
               <a:r>
-                <a:rPr kumimoji="0" lang="en-US" sz="1400" b="1" i="0" u="none" strike="noStrike" kern="0" cap="none" spc="0" normalizeH="0" baseline="0" noProof="0" dirty="0">
+                <a:rPr kumimoji="0" lang="en-US" sz="1100" b="1" i="0" u="none" strike="noStrike" kern="0" cap="none" spc="0" normalizeH="0" baseline="0" noProof="0" dirty="0">
                   <a:ln>
                     <a:noFill/>
                   </a:ln>
@@ -7605,7 +7604,33 @@
                   <a:ea typeface="+mn-ea"/>
                   <a:cs typeface="+mn-cs"/>
                 </a:rPr>
-                <a:t>Transformation Layer  (Optional)</a:t>
+                <a:t>Transformation Layer  (</a:t>
+              </a:r>
+              <a:r>
+                <a:rPr lang="en-US" sz="1100" b="1" kern="0" dirty="0">
+                  <a:solidFill>
+                    <a:prstClr val="white"/>
+                  </a:solidFill>
+                  <a:latin typeface="Calibri" panose="020F0502020204030204"/>
+                </a:rPr>
+                <a:t>X12 to FHIR - </a:t>
+              </a:r>
+              <a:r>
+                <a:rPr kumimoji="0" lang="en-US" sz="1100" b="1" i="0" u="none" strike="noStrike" kern="0" cap="none" spc="0" normalizeH="0" baseline="0" noProof="0" dirty="0">
+                  <a:ln>
+                    <a:noFill/>
+                  </a:ln>
+                  <a:solidFill>
+                    <a:prstClr val="white"/>
+                  </a:solidFill>
+                  <a:effectLst/>
+                  <a:uLnTx/>
+                  <a:uFillTx/>
+                  <a:latin typeface="Calibri" panose="020F0502020204030204"/>
+                  <a:ea typeface="+mn-ea"/>
+                  <a:cs typeface="+mn-cs"/>
+                </a:rPr>
+                <a:t>Optional)</a:t>
               </a:r>
             </a:p>
           </p:txBody>
@@ -7664,7 +7689,7 @@
                 <a:defRPr/>
               </a:pPr>
               <a:r>
-                <a:rPr kumimoji="0" lang="en-US" sz="1400" b="1" i="0" u="none" strike="noStrike" kern="0" cap="none" spc="0" normalizeH="0" baseline="0" noProof="0" dirty="0">
+                <a:rPr kumimoji="0" lang="en-US" sz="1200" b="1" i="0" u="none" strike="noStrike" kern="0" cap="none" spc="0" normalizeH="0" baseline="0" noProof="0" dirty="0">
                   <a:ln>
                     <a:noFill/>
                   </a:ln>
@@ -7678,8 +7703,22 @@
                   <a:ea typeface="+mn-ea"/>
                   <a:cs typeface="+mn-cs"/>
                 </a:rPr>
-                <a:t>Transformation Layer</a:t>
+                <a:t>Transformation Layer (FHIR to X12)</a:t>
               </a:r>
+              <a:endParaRPr kumimoji="0" lang="en-US" sz="1400" b="1" i="0" u="none" strike="noStrike" kern="0" cap="none" spc="0" normalizeH="0" baseline="0" noProof="0" dirty="0">
+                <a:ln>
+                  <a:noFill/>
+                </a:ln>
+                <a:solidFill>
+                  <a:prstClr val="white"/>
+                </a:solidFill>
+                <a:effectLst/>
+                <a:uLnTx/>
+                <a:uFillTx/>
+                <a:latin typeface="Calibri" panose="020F0502020204030204"/>
+                <a:ea typeface="+mn-ea"/>
+                <a:cs typeface="+mn-cs"/>
+              </a:endParaRPr>
             </a:p>
           </p:txBody>
         </p:sp>
@@ -7806,7 +7845,7 @@
                 <a:defRPr/>
               </a:pPr>
               <a:r>
-                <a:rPr kumimoji="0" lang="en-US" sz="1400" b="1" i="0" u="none" strike="noStrike" kern="0" cap="none" spc="0" normalizeH="0" baseline="0" noProof="0" dirty="0">
+                <a:rPr kumimoji="0" lang="en-US" sz="1400" b="1" i="0" u="none" strike="noStrike" kern="0" cap="none" spc="0" normalizeH="0" baseline="0" noProof="0">
                   <a:ln>
                     <a:noFill/>
                   </a:ln>
@@ -7822,42 +7861,20 @@
                 </a:rPr>
                 <a:t>X12 275</a:t>
               </a:r>
-            </a:p>
-            <a:p>
-              <a:pPr marL="0" marR="0" lvl="0" indent="0" algn="ctr" defTabSz="914400" eaLnBrk="1" fontAlgn="auto" latinLnBrk="0" hangingPunct="1">
-                <a:lnSpc>
-                  <a:spcPct val="100000"/>
-                </a:lnSpc>
-                <a:spcBef>
-                  <a:spcPts val="0"/>
-                </a:spcBef>
-                <a:spcAft>
-                  <a:spcPts val="0"/>
-                </a:spcAft>
-                <a:buClrTx/>
-                <a:buSzTx/>
-                <a:buFontTx/>
-                <a:buNone/>
-                <a:tabLst/>
-                <a:defRPr/>
-              </a:pPr>
-              <a:r>
-                <a:rPr kumimoji="0" lang="en-US" sz="1000" b="1" i="0" u="none" strike="noStrike" kern="0" cap="none" spc="0" normalizeH="0" baseline="0" noProof="0" dirty="0">
-                  <a:ln>
-                    <a:noFill/>
-                  </a:ln>
-                  <a:solidFill>
-                    <a:prstClr val="black"/>
-                  </a:solidFill>
-                  <a:effectLst/>
-                  <a:uLnTx/>
-                  <a:uFillTx/>
-                  <a:latin typeface="Calibri" panose="020F0502020204030204"/>
-                  <a:ea typeface="+mn-ea"/>
-                  <a:cs typeface="+mn-cs"/>
-                </a:rPr>
-                <a:t>if required</a:t>
-              </a:r>
+              <a:endParaRPr kumimoji="0" lang="en-US" sz="1400" b="1" i="0" u="none" strike="noStrike" kern="0" cap="none" spc="0" normalizeH="0" baseline="0" noProof="0" dirty="0">
+                <a:ln>
+                  <a:noFill/>
+                </a:ln>
+                <a:solidFill>
+                  <a:prstClr val="black"/>
+                </a:solidFill>
+                <a:effectLst/>
+                <a:uLnTx/>
+                <a:uFillTx/>
+                <a:latin typeface="Calibri" panose="020F0502020204030204"/>
+                <a:ea typeface="+mn-ea"/>
+                <a:cs typeface="+mn-cs"/>
+              </a:endParaRPr>
             </a:p>
           </p:txBody>
         </p:sp>
@@ -7936,10 +7953,10 @@
         </p:nvGrpSpPr>
         <p:grpSpPr>
           <a:xfrm>
-            <a:off x="909811" y="84207"/>
-            <a:ext cx="7594691" cy="5169873"/>
-            <a:chOff x="909811" y="84207"/>
-            <a:chExt cx="7594691" cy="5169873"/>
+            <a:off x="474255" y="84207"/>
+            <a:ext cx="8608447" cy="5180552"/>
+            <a:chOff x="474255" y="84207"/>
+            <a:chExt cx="8608447" cy="5180552"/>
           </a:xfrm>
         </p:grpSpPr>
         <p:sp>
@@ -8683,8 +8700,8 @@
           </p:nvSpPr>
           <p:spPr>
             <a:xfrm>
-              <a:off x="4569300" y="1772931"/>
-              <a:ext cx="708720" cy="307777"/>
+              <a:off x="4260008" y="1692765"/>
+              <a:ext cx="1314655" cy="307777"/>
             </a:xfrm>
             <a:prstGeom prst="rect">
               <a:avLst/>
@@ -8699,7 +8716,7 @@
             <a:p>
               <a:r>
                 <a:rPr lang="en-CA" sz="1400" dirty="0"/>
-                <a:t>SMART</a:t>
+                <a:t>SMART on FHIR</a:t>
               </a:r>
             </a:p>
           </p:txBody>
@@ -9339,7 +9356,7 @@
             <p:spPr>
               <a:xfrm>
                 <a:off x="2017587" y="2751111"/>
-                <a:ext cx="1351652" cy="307777"/>
+                <a:ext cx="1268296" cy="307777"/>
               </a:xfrm>
               <a:prstGeom prst="rect">
                 <a:avLst/>
@@ -9358,7 +9375,7 @@
                       <a:srgbClr val="0070C0"/>
                     </a:solidFill>
                   </a:rPr>
-                  <a:t>278 (and 275s?)</a:t>
+                  <a:t>278 and 275(s)</a:t>
                 </a:r>
               </a:p>
             </p:txBody>
@@ -9957,7 +9974,7 @@
             <p:spPr>
               <a:xfrm>
                 <a:off x="2017587" y="2751111"/>
-                <a:ext cx="1351652" cy="307777"/>
+                <a:ext cx="1268296" cy="307777"/>
               </a:xfrm>
               <a:prstGeom prst="rect">
                 <a:avLst/>
@@ -9971,13 +9988,18 @@
               <a:lstStyle/>
               <a:p>
                 <a:r>
-                  <a:rPr lang="en-CA" sz="1400" dirty="0">
+                  <a:rPr lang="en-CA" sz="1400">
                     <a:solidFill>
                       <a:srgbClr val="0070C0"/>
                     </a:solidFill>
                   </a:rPr>
-                  <a:t>278 (and 275s?)</a:t>
+                  <a:t>278 and 275(s)</a:t>
                 </a:r>
+                <a:endParaRPr lang="en-CA" sz="1400" dirty="0">
+                  <a:solidFill>
+                    <a:srgbClr val="0070C0"/>
+                  </a:solidFill>
+                </a:endParaRPr>
               </a:p>
             </p:txBody>
           </p:sp>
@@ -10320,8 +10342,8 @@
           </p:nvSpPr>
           <p:spPr>
             <a:xfrm>
-              <a:off x="1835916" y="4992470"/>
-              <a:ext cx="6660798" cy="261610"/>
+              <a:off x="474255" y="5003149"/>
+              <a:ext cx="8608447" cy="261610"/>
             </a:xfrm>
             <a:prstGeom prst="rect">
               <a:avLst/>
@@ -10336,7 +10358,7 @@
             <a:p>
               <a:r>
                 <a:rPr lang="en-CA" sz="1100" dirty="0"/>
-                <a:t>NOTE: In some cases, X12 portion will be handled entirely within clearing House and CH&lt;-&gt;Payer will also be FHIR</a:t>
+                <a:t>NOTE: final processing entity might receive FHIR rather than X12, so long as an intermediary party has converted data to X12 as part of the process.</a:t>
               </a:r>
             </a:p>
           </p:txBody>

</xml_diff>

<commit_message>
Fixed more JIRA issues.
</commit_message>
<xml_diff>
--- a/images-source/drawings.pptx
+++ b/images-source/drawings.pptx
@@ -5,13 +5,14 @@
     <p:sldMasterId id="2147483660" r:id="rId1"/>
   </p:sldMasterIdLst>
   <p:notesMasterIdLst>
-    <p:notesMasterId r:id="rId6"/>
+    <p:notesMasterId r:id="rId7"/>
   </p:notesMasterIdLst>
   <p:sldIdLst>
     <p:sldId id="636" r:id="rId2"/>
     <p:sldId id="691" r:id="rId3"/>
     <p:sldId id="952" r:id="rId4"/>
     <p:sldId id="953" r:id="rId5"/>
+    <p:sldId id="954" r:id="rId6"/>
   </p:sldIdLst>
   <p:sldSz cx="12192000" cy="6858000"/>
   <p:notesSz cx="7010400" cy="9296400"/>
@@ -223,7 +224,7 @@
           <a:p>
             <a:fld id="{3D08445B-C90C-48FE-A35E-E6945CACA392}" type="datetimeFigureOut">
               <a:rPr lang="en-US" smtClean="0"/>
-              <a:t>8/24/20</a:t>
+              <a:t>9/15/20</a:t>
             </a:fld>
             <a:endParaRPr lang="en-US" dirty="0"/>
           </a:p>
@@ -8978,7 +8979,7 @@
             <p:spPr>
               <a:xfrm>
                 <a:off x="2124945" y="2751111"/>
-                <a:ext cx="634404" cy="307777"/>
+                <a:ext cx="1253164" cy="307777"/>
               </a:xfrm>
               <a:prstGeom prst="rect">
                 <a:avLst/>
@@ -8997,7 +8998,7 @@
                       <a:srgbClr val="FF0000"/>
                     </a:solidFill>
                   </a:rPr>
-                  <a:t>Query</a:t>
+                  <a:t>Inquiry Bundle</a:t>
                 </a:r>
               </a:p>
             </p:txBody>
@@ -9058,7 +9059,7 @@
             <p:spPr>
               <a:xfrm>
                 <a:off x="2124945" y="3021621"/>
-                <a:ext cx="1490408" cy="307777"/>
+                <a:ext cx="1556132" cy="307777"/>
               </a:xfrm>
               <a:prstGeom prst="rect">
                 <a:avLst/>
@@ -9077,7 +9078,7 @@
                       <a:srgbClr val="FF0000"/>
                     </a:solidFill>
                   </a:rPr>
-                  <a:t>Query </a:t>
+                  <a:t>Inquiry </a:t>
                 </a:r>
                 <a:r>
                   <a:rPr lang="en-CA" sz="1400" dirty="0" err="1">
@@ -10377,6 +10378,655 @@
 </p:sld>
 </file>
 
+<file path=ppt/slides/slide5.xml><?xml version="1.0" encoding="utf-8"?>
+<p:sld xmlns:a="http://schemas.openxmlformats.org/drawingml/2006/main" xmlns:r="http://schemas.openxmlformats.org/officeDocument/2006/relationships" xmlns:p="http://schemas.openxmlformats.org/presentationml/2006/main">
+  <p:cSld>
+    <p:spTree>
+      <p:nvGrpSpPr>
+        <p:cNvPr id="1" name=""/>
+        <p:cNvGrpSpPr/>
+        <p:nvPr/>
+      </p:nvGrpSpPr>
+      <p:grpSpPr>
+        <a:xfrm>
+          <a:off x="0" y="0"/>
+          <a:ext cx="0" cy="0"/>
+          <a:chOff x="0" y="0"/>
+          <a:chExt cx="0" cy="0"/>
+        </a:xfrm>
+      </p:grpSpPr>
+      <p:sp>
+        <p:nvSpPr>
+          <p:cNvPr id="2" name="Rounded Rectangle 1">
+            <a:extLst>
+              <a:ext uri="{FF2B5EF4-FFF2-40B4-BE49-F238E27FC236}">
+                <a16:creationId xmlns:a16="http://schemas.microsoft.com/office/drawing/2014/main" id="{B1EC0269-2634-6546-B414-2135310E484A}"/>
+              </a:ext>
+            </a:extLst>
+          </p:cNvPr>
+          <p:cNvSpPr/>
+          <p:nvPr/>
+        </p:nvSpPr>
+        <p:spPr>
+          <a:xfrm>
+            <a:off x="1113183" y="457200"/>
+            <a:ext cx="4124739" cy="5993296"/>
+          </a:xfrm>
+          <a:prstGeom prst="roundRect">
+            <a:avLst/>
+          </a:prstGeom>
+        </p:spPr>
+        <p:style>
+          <a:lnRef idx="2">
+            <a:schemeClr val="accent1">
+              <a:shade val="50000"/>
+            </a:schemeClr>
+          </a:lnRef>
+          <a:fillRef idx="1">
+            <a:schemeClr val="accent1"/>
+          </a:fillRef>
+          <a:effectRef idx="0">
+            <a:schemeClr val="accent1"/>
+          </a:effectRef>
+          <a:fontRef idx="minor">
+            <a:schemeClr val="lt1"/>
+          </a:fontRef>
+        </p:style>
+        <p:txBody>
+          <a:bodyPr rtlCol="0" anchor="t" anchorCtr="0"/>
+          <a:lstStyle/>
+          <a:p>
+            <a:pPr algn="ctr"/>
+            <a:r>
+              <a:rPr lang="en-US" dirty="0"/>
+              <a:t>PAS Request Bundle</a:t>
+            </a:r>
+          </a:p>
+        </p:txBody>
+      </p:sp>
+      <p:sp>
+        <p:nvSpPr>
+          <p:cNvPr id="4" name="Rounded Rectangle 3">
+            <a:extLst>
+              <a:ext uri="{FF2B5EF4-FFF2-40B4-BE49-F238E27FC236}">
+                <a16:creationId xmlns:a16="http://schemas.microsoft.com/office/drawing/2014/main" id="{D9F4FB82-0E9E-FC4A-9ADD-F8B1A4604CD1}"/>
+              </a:ext>
+            </a:extLst>
+          </p:cNvPr>
+          <p:cNvSpPr/>
+          <p:nvPr/>
+        </p:nvSpPr>
+        <p:spPr>
+          <a:xfrm>
+            <a:off x="1569002" y="1219200"/>
+            <a:ext cx="3213100" cy="927100"/>
+          </a:xfrm>
+          <a:prstGeom prst="roundRect">
+            <a:avLst/>
+          </a:prstGeom>
+        </p:spPr>
+        <p:style>
+          <a:lnRef idx="2">
+            <a:schemeClr val="accent2">
+              <a:shade val="50000"/>
+            </a:schemeClr>
+          </a:lnRef>
+          <a:fillRef idx="1">
+            <a:schemeClr val="accent2"/>
+          </a:fillRef>
+          <a:effectRef idx="0">
+            <a:schemeClr val="accent2"/>
+          </a:effectRef>
+          <a:fontRef idx="minor">
+            <a:schemeClr val="lt1"/>
+          </a:fontRef>
+        </p:style>
+        <p:txBody>
+          <a:bodyPr rtlCol="0" anchor="ctr"/>
+          <a:lstStyle/>
+          <a:p>
+            <a:pPr algn="ctr"/>
+            <a:r>
+              <a:rPr lang="en-US" dirty="0"/>
+              <a:t>Claim</a:t>
+            </a:r>
+          </a:p>
+        </p:txBody>
+      </p:sp>
+      <p:grpSp>
+        <p:nvGrpSpPr>
+          <p:cNvPr id="12" name="Group 11">
+            <a:extLst>
+              <a:ext uri="{FF2B5EF4-FFF2-40B4-BE49-F238E27FC236}">
+                <a16:creationId xmlns:a16="http://schemas.microsoft.com/office/drawing/2014/main" id="{5D00A0F9-7B79-614F-9A6E-E7A3AD4F3895}"/>
+              </a:ext>
+            </a:extLst>
+          </p:cNvPr>
+          <p:cNvGrpSpPr/>
+          <p:nvPr/>
+        </p:nvGrpSpPr>
+        <p:grpSpPr>
+          <a:xfrm>
+            <a:off x="1550504" y="3568700"/>
+            <a:ext cx="3213100" cy="2246796"/>
+            <a:chOff x="1550504" y="3568700"/>
+            <a:chExt cx="3213100" cy="2246796"/>
+          </a:xfrm>
+        </p:grpSpPr>
+        <p:sp>
+          <p:nvSpPr>
+            <p:cNvPr id="10" name="Rounded Rectangle 9">
+              <a:extLst>
+                <a:ext uri="{FF2B5EF4-FFF2-40B4-BE49-F238E27FC236}">
+                  <a16:creationId xmlns:a16="http://schemas.microsoft.com/office/drawing/2014/main" id="{1A72941E-F160-264E-A266-DCCFC51214F5}"/>
+                </a:ext>
+              </a:extLst>
+            </p:cNvPr>
+            <p:cNvSpPr/>
+            <p:nvPr/>
+          </p:nvSpPr>
+          <p:spPr>
+            <a:xfrm>
+              <a:off x="1550504" y="3568700"/>
+              <a:ext cx="3213100" cy="685800"/>
+            </a:xfrm>
+            <a:prstGeom prst="roundRect">
+              <a:avLst/>
+            </a:prstGeom>
+          </p:spPr>
+          <p:style>
+            <a:lnRef idx="2">
+              <a:schemeClr val="accent2">
+                <a:shade val="50000"/>
+              </a:schemeClr>
+            </a:lnRef>
+            <a:fillRef idx="1">
+              <a:schemeClr val="accent2"/>
+            </a:fillRef>
+            <a:effectRef idx="0">
+              <a:schemeClr val="accent2"/>
+            </a:effectRef>
+            <a:fontRef idx="minor">
+              <a:schemeClr val="lt1"/>
+            </a:fontRef>
+          </p:style>
+          <p:txBody>
+            <a:bodyPr rtlCol="0" anchor="ctr"/>
+            <a:lstStyle/>
+            <a:p>
+              <a:pPr algn="ctr"/>
+              <a:r>
+                <a:rPr lang="en-US" dirty="0"/>
+                <a:t>Organization</a:t>
+              </a:r>
+            </a:p>
+            <a:p>
+              <a:pPr algn="ctr"/>
+              <a:r>
+                <a:rPr lang="en-US" dirty="0"/>
+                <a:t>(Insurer, Requestor)</a:t>
+              </a:r>
+            </a:p>
+          </p:txBody>
+        </p:sp>
+        <p:sp>
+          <p:nvSpPr>
+            <p:cNvPr id="65" name="Rounded Rectangle 64">
+              <a:extLst>
+                <a:ext uri="{FF2B5EF4-FFF2-40B4-BE49-F238E27FC236}">
+                  <a16:creationId xmlns:a16="http://schemas.microsoft.com/office/drawing/2014/main" id="{F9A63947-15CF-AF49-8FFD-1836D78DC2F6}"/>
+                </a:ext>
+              </a:extLst>
+            </p:cNvPr>
+            <p:cNvSpPr/>
+            <p:nvPr/>
+          </p:nvSpPr>
+          <p:spPr>
+            <a:xfrm>
+              <a:off x="1550504" y="4349198"/>
+              <a:ext cx="3213100" cy="685800"/>
+            </a:xfrm>
+            <a:prstGeom prst="roundRect">
+              <a:avLst/>
+            </a:prstGeom>
+          </p:spPr>
+          <p:style>
+            <a:lnRef idx="2">
+              <a:schemeClr val="accent2">
+                <a:shade val="50000"/>
+              </a:schemeClr>
+            </a:lnRef>
+            <a:fillRef idx="1">
+              <a:schemeClr val="accent2"/>
+            </a:fillRef>
+            <a:effectRef idx="0">
+              <a:schemeClr val="accent2"/>
+            </a:effectRef>
+            <a:fontRef idx="minor">
+              <a:schemeClr val="lt1"/>
+            </a:fontRef>
+          </p:style>
+          <p:txBody>
+            <a:bodyPr rtlCol="0" anchor="ctr"/>
+            <a:lstStyle/>
+            <a:p>
+              <a:pPr algn="ctr"/>
+              <a:r>
+                <a:rPr lang="en-US" dirty="0"/>
+                <a:t>Patient</a:t>
+              </a:r>
+            </a:p>
+          </p:txBody>
+        </p:sp>
+        <p:sp>
+          <p:nvSpPr>
+            <p:cNvPr id="66" name="Rounded Rectangle 65">
+              <a:extLst>
+                <a:ext uri="{FF2B5EF4-FFF2-40B4-BE49-F238E27FC236}">
+                  <a16:creationId xmlns:a16="http://schemas.microsoft.com/office/drawing/2014/main" id="{B7C9BA29-9195-204C-8C71-2E7732A54A22}"/>
+                </a:ext>
+              </a:extLst>
+            </p:cNvPr>
+            <p:cNvSpPr/>
+            <p:nvPr/>
+          </p:nvSpPr>
+          <p:spPr>
+            <a:xfrm>
+              <a:off x="1550504" y="5129696"/>
+              <a:ext cx="3213100" cy="685800"/>
+            </a:xfrm>
+            <a:prstGeom prst="roundRect">
+              <a:avLst/>
+            </a:prstGeom>
+          </p:spPr>
+          <p:style>
+            <a:lnRef idx="2">
+              <a:schemeClr val="accent2">
+                <a:shade val="50000"/>
+              </a:schemeClr>
+            </a:lnRef>
+            <a:fillRef idx="1">
+              <a:schemeClr val="accent2"/>
+            </a:fillRef>
+            <a:effectRef idx="0">
+              <a:schemeClr val="accent2"/>
+            </a:effectRef>
+            <a:fontRef idx="minor">
+              <a:schemeClr val="lt1"/>
+            </a:fontRef>
+          </p:style>
+          <p:txBody>
+            <a:bodyPr rtlCol="0" anchor="ctr"/>
+            <a:lstStyle/>
+            <a:p>
+              <a:pPr algn="ctr"/>
+              <a:r>
+                <a:rPr lang="en-US" dirty="0"/>
+                <a:t>Coverage</a:t>
+              </a:r>
+            </a:p>
+          </p:txBody>
+        </p:sp>
+      </p:grpSp>
+      <p:sp>
+        <p:nvSpPr>
+          <p:cNvPr id="68" name="Rounded Rectangle 67">
+            <a:extLst>
+              <a:ext uri="{FF2B5EF4-FFF2-40B4-BE49-F238E27FC236}">
+                <a16:creationId xmlns:a16="http://schemas.microsoft.com/office/drawing/2014/main" id="{4590C0A2-2F0E-3941-B458-B09E1382E775}"/>
+              </a:ext>
+            </a:extLst>
+          </p:cNvPr>
+          <p:cNvSpPr/>
+          <p:nvPr/>
+        </p:nvSpPr>
+        <p:spPr>
+          <a:xfrm>
+            <a:off x="1569002" y="2240998"/>
+            <a:ext cx="3213100" cy="1153353"/>
+          </a:xfrm>
+          <a:prstGeom prst="roundRect">
+            <a:avLst/>
+          </a:prstGeom>
+        </p:spPr>
+        <p:style>
+          <a:lnRef idx="2">
+            <a:schemeClr val="accent2">
+              <a:shade val="50000"/>
+            </a:schemeClr>
+          </a:lnRef>
+          <a:fillRef idx="1">
+            <a:schemeClr val="accent2"/>
+          </a:fillRef>
+          <a:effectRef idx="0">
+            <a:schemeClr val="accent2"/>
+          </a:effectRef>
+          <a:fontRef idx="minor">
+            <a:schemeClr val="lt1"/>
+          </a:fontRef>
+        </p:style>
+        <p:txBody>
+          <a:bodyPr rtlCol="0" anchor="ctr"/>
+          <a:lstStyle/>
+          <a:p>
+            <a:pPr algn="ctr"/>
+            <a:r>
+              <a:rPr lang="en-US" dirty="0"/>
+              <a:t>Request Items</a:t>
+            </a:r>
+          </a:p>
+          <a:p>
+            <a:pPr algn="ctr"/>
+            <a:r>
+              <a:rPr lang="en-US" dirty="0"/>
+              <a:t>(ServiceRequest, </a:t>
+            </a:r>
+            <a:r>
+              <a:rPr lang="en-US" dirty="0" err="1"/>
+              <a:t>DeviceRequest</a:t>
+            </a:r>
+            <a:r>
+              <a:rPr lang="en-US" dirty="0"/>
+              <a:t>, </a:t>
+            </a:r>
+            <a:r>
+              <a:rPr lang="en-US" dirty="0" err="1"/>
+              <a:t>MedicationRequest</a:t>
+            </a:r>
+            <a:r>
+              <a:rPr lang="en-US" dirty="0"/>
+              <a:t>)</a:t>
+            </a:r>
+          </a:p>
+        </p:txBody>
+      </p:sp>
+      <p:sp>
+        <p:nvSpPr>
+          <p:cNvPr id="69" name="Rounded Rectangle 68">
+            <a:extLst>
+              <a:ext uri="{FF2B5EF4-FFF2-40B4-BE49-F238E27FC236}">
+                <a16:creationId xmlns:a16="http://schemas.microsoft.com/office/drawing/2014/main" id="{D5D662E4-95DF-E145-92F0-83EC02F61EB7}"/>
+              </a:ext>
+            </a:extLst>
+          </p:cNvPr>
+          <p:cNvSpPr/>
+          <p:nvPr/>
+        </p:nvSpPr>
+        <p:spPr>
+          <a:xfrm>
+            <a:off x="5693741" y="457200"/>
+            <a:ext cx="4124739" cy="5993296"/>
+          </a:xfrm>
+          <a:prstGeom prst="roundRect">
+            <a:avLst/>
+          </a:prstGeom>
+        </p:spPr>
+        <p:style>
+          <a:lnRef idx="2">
+            <a:schemeClr val="accent1">
+              <a:shade val="50000"/>
+            </a:schemeClr>
+          </a:lnRef>
+          <a:fillRef idx="1">
+            <a:schemeClr val="accent1"/>
+          </a:fillRef>
+          <a:effectRef idx="0">
+            <a:schemeClr val="accent1"/>
+          </a:effectRef>
+          <a:fontRef idx="minor">
+            <a:schemeClr val="lt1"/>
+          </a:fontRef>
+        </p:style>
+        <p:txBody>
+          <a:bodyPr rtlCol="0" anchor="t" anchorCtr="0"/>
+          <a:lstStyle/>
+          <a:p>
+            <a:pPr algn="ctr"/>
+            <a:r>
+              <a:rPr lang="en-US" dirty="0"/>
+              <a:t>PAS Response Bundle</a:t>
+            </a:r>
+          </a:p>
+        </p:txBody>
+      </p:sp>
+      <p:sp>
+        <p:nvSpPr>
+          <p:cNvPr id="70" name="Rounded Rectangle 69">
+            <a:extLst>
+              <a:ext uri="{FF2B5EF4-FFF2-40B4-BE49-F238E27FC236}">
+                <a16:creationId xmlns:a16="http://schemas.microsoft.com/office/drawing/2014/main" id="{666545B4-EE30-0049-B6F7-2057FB8399C6}"/>
+              </a:ext>
+            </a:extLst>
+          </p:cNvPr>
+          <p:cNvSpPr/>
+          <p:nvPr/>
+        </p:nvSpPr>
+        <p:spPr>
+          <a:xfrm>
+            <a:off x="6149560" y="1219200"/>
+            <a:ext cx="3213100" cy="927100"/>
+          </a:xfrm>
+          <a:prstGeom prst="roundRect">
+            <a:avLst/>
+          </a:prstGeom>
+        </p:spPr>
+        <p:style>
+          <a:lnRef idx="2">
+            <a:schemeClr val="accent2">
+              <a:shade val="50000"/>
+            </a:schemeClr>
+          </a:lnRef>
+          <a:fillRef idx="1">
+            <a:schemeClr val="accent2"/>
+          </a:fillRef>
+          <a:effectRef idx="0">
+            <a:schemeClr val="accent2"/>
+          </a:effectRef>
+          <a:fontRef idx="minor">
+            <a:schemeClr val="lt1"/>
+          </a:fontRef>
+        </p:style>
+        <p:txBody>
+          <a:bodyPr rtlCol="0" anchor="ctr"/>
+          <a:lstStyle/>
+          <a:p>
+            <a:pPr algn="ctr"/>
+            <a:r>
+              <a:rPr lang="en-US" dirty="0" err="1"/>
+              <a:t>ClaimResponse</a:t>
+            </a:r>
+            <a:endParaRPr lang="en-US" dirty="0"/>
+          </a:p>
+        </p:txBody>
+      </p:sp>
+      <p:grpSp>
+        <p:nvGrpSpPr>
+          <p:cNvPr id="71" name="Group 70">
+            <a:extLst>
+              <a:ext uri="{FF2B5EF4-FFF2-40B4-BE49-F238E27FC236}">
+                <a16:creationId xmlns:a16="http://schemas.microsoft.com/office/drawing/2014/main" id="{4A86FD7E-9C3F-014F-A15C-0FEB4043C8E1}"/>
+              </a:ext>
+            </a:extLst>
+          </p:cNvPr>
+          <p:cNvGrpSpPr/>
+          <p:nvPr/>
+        </p:nvGrpSpPr>
+        <p:grpSpPr>
+          <a:xfrm>
+            <a:off x="6131062" y="3568700"/>
+            <a:ext cx="3213100" cy="2246796"/>
+            <a:chOff x="1550504" y="3568700"/>
+            <a:chExt cx="3213100" cy="2246796"/>
+          </a:xfrm>
+        </p:grpSpPr>
+        <p:sp>
+          <p:nvSpPr>
+            <p:cNvPr id="72" name="Rounded Rectangle 71">
+              <a:extLst>
+                <a:ext uri="{FF2B5EF4-FFF2-40B4-BE49-F238E27FC236}">
+                  <a16:creationId xmlns:a16="http://schemas.microsoft.com/office/drawing/2014/main" id="{9C22FAF2-F6D8-9C44-8E65-92CE17B7A961}"/>
+                </a:ext>
+              </a:extLst>
+            </p:cNvPr>
+            <p:cNvSpPr/>
+            <p:nvPr/>
+          </p:nvSpPr>
+          <p:spPr>
+            <a:xfrm>
+              <a:off x="1550504" y="3568700"/>
+              <a:ext cx="3213100" cy="685800"/>
+            </a:xfrm>
+            <a:prstGeom prst="roundRect">
+              <a:avLst/>
+            </a:prstGeom>
+          </p:spPr>
+          <p:style>
+            <a:lnRef idx="2">
+              <a:schemeClr val="accent2">
+                <a:shade val="50000"/>
+              </a:schemeClr>
+            </a:lnRef>
+            <a:fillRef idx="1">
+              <a:schemeClr val="accent2"/>
+            </a:fillRef>
+            <a:effectRef idx="0">
+              <a:schemeClr val="accent2"/>
+            </a:effectRef>
+            <a:fontRef idx="minor">
+              <a:schemeClr val="lt1"/>
+            </a:fontRef>
+          </p:style>
+          <p:txBody>
+            <a:bodyPr rtlCol="0" anchor="ctr"/>
+            <a:lstStyle/>
+            <a:p>
+              <a:pPr algn="ctr"/>
+              <a:r>
+                <a:rPr lang="en-US" dirty="0"/>
+                <a:t>Organization</a:t>
+              </a:r>
+            </a:p>
+            <a:p>
+              <a:pPr algn="ctr"/>
+              <a:r>
+                <a:rPr lang="en-US" dirty="0"/>
+                <a:t>(Insurer, Requestor)</a:t>
+              </a:r>
+            </a:p>
+          </p:txBody>
+        </p:sp>
+        <p:sp>
+          <p:nvSpPr>
+            <p:cNvPr id="74" name="Rounded Rectangle 73">
+              <a:extLst>
+                <a:ext uri="{FF2B5EF4-FFF2-40B4-BE49-F238E27FC236}">
+                  <a16:creationId xmlns:a16="http://schemas.microsoft.com/office/drawing/2014/main" id="{DDF80091-0F57-3047-8F24-363ACDDF5527}"/>
+                </a:ext>
+              </a:extLst>
+            </p:cNvPr>
+            <p:cNvSpPr/>
+            <p:nvPr/>
+          </p:nvSpPr>
+          <p:spPr>
+            <a:xfrm>
+              <a:off x="1550504" y="4349198"/>
+              <a:ext cx="3213100" cy="685800"/>
+            </a:xfrm>
+            <a:prstGeom prst="roundRect">
+              <a:avLst/>
+            </a:prstGeom>
+          </p:spPr>
+          <p:style>
+            <a:lnRef idx="2">
+              <a:schemeClr val="accent2">
+                <a:shade val="50000"/>
+              </a:schemeClr>
+            </a:lnRef>
+            <a:fillRef idx="1">
+              <a:schemeClr val="accent2"/>
+            </a:fillRef>
+            <a:effectRef idx="0">
+              <a:schemeClr val="accent2"/>
+            </a:effectRef>
+            <a:fontRef idx="minor">
+              <a:schemeClr val="lt1"/>
+            </a:fontRef>
+          </p:style>
+          <p:txBody>
+            <a:bodyPr rtlCol="0" anchor="ctr"/>
+            <a:lstStyle/>
+            <a:p>
+              <a:pPr algn="ctr"/>
+              <a:r>
+                <a:rPr lang="en-US" dirty="0"/>
+                <a:t>Patient</a:t>
+              </a:r>
+            </a:p>
+          </p:txBody>
+        </p:sp>
+        <p:sp>
+          <p:nvSpPr>
+            <p:cNvPr id="75" name="Rounded Rectangle 74">
+              <a:extLst>
+                <a:ext uri="{FF2B5EF4-FFF2-40B4-BE49-F238E27FC236}">
+                  <a16:creationId xmlns:a16="http://schemas.microsoft.com/office/drawing/2014/main" id="{C6048061-5B0A-D244-ABA1-30B5FF513068}"/>
+                </a:ext>
+              </a:extLst>
+            </p:cNvPr>
+            <p:cNvSpPr/>
+            <p:nvPr/>
+          </p:nvSpPr>
+          <p:spPr>
+            <a:xfrm>
+              <a:off x="1550504" y="5129696"/>
+              <a:ext cx="3213100" cy="685800"/>
+            </a:xfrm>
+            <a:prstGeom prst="roundRect">
+              <a:avLst/>
+            </a:prstGeom>
+          </p:spPr>
+          <p:style>
+            <a:lnRef idx="2">
+              <a:schemeClr val="accent2">
+                <a:shade val="50000"/>
+              </a:schemeClr>
+            </a:lnRef>
+            <a:fillRef idx="1">
+              <a:schemeClr val="accent2"/>
+            </a:fillRef>
+            <a:effectRef idx="0">
+              <a:schemeClr val="accent2"/>
+            </a:effectRef>
+            <a:fontRef idx="minor">
+              <a:schemeClr val="lt1"/>
+            </a:fontRef>
+          </p:style>
+          <p:txBody>
+            <a:bodyPr rtlCol="0" anchor="ctr"/>
+            <a:lstStyle/>
+            <a:p>
+              <a:pPr algn="ctr"/>
+              <a:r>
+                <a:rPr lang="en-US" dirty="0"/>
+                <a:t>Coverage</a:t>
+              </a:r>
+            </a:p>
+          </p:txBody>
+        </p:sp>
+      </p:grpSp>
+    </p:spTree>
+    <p:extLst>
+      <p:ext uri="{BB962C8B-B14F-4D97-AF65-F5344CB8AC3E}">
+        <p14:creationId xmlns:p14="http://schemas.microsoft.com/office/powerpoint/2010/main" val="3785284013"/>
+      </p:ext>
+    </p:extLst>
+  </p:cSld>
+  <p:clrMapOvr>
+    <a:masterClrMapping/>
+  </p:clrMapOvr>
+</p:sld>
+</file>
+
 <file path=ppt/theme/theme1.xml><?xml version="1.0" encoding="utf-8"?>
 <a:theme xmlns:a="http://schemas.openxmlformats.org/drawingml/2006/main" name="1_Office Theme">
   <a:themeElements>

</xml_diff>

<commit_message>
Made more changes due to JIRA tickets.
</commit_message>
<xml_diff>
--- a/images-source/drawings.pptx
+++ b/images-source/drawings.pptx
@@ -224,7 +224,7 @@
           <a:p>
             <a:fld id="{3D08445B-C90C-48FE-A35E-E6945CACA392}" type="datetimeFigureOut">
               <a:rPr lang="en-US" smtClean="0"/>
-              <a:t>9/15/20</a:t>
+              <a:t>10/13/20</a:t>
             </a:fld>
             <a:endParaRPr lang="en-US" dirty="0"/>
           </a:p>
@@ -7955,9 +7955,9 @@
         <p:grpSpPr>
           <a:xfrm>
             <a:off x="474255" y="84207"/>
-            <a:ext cx="8608447" cy="5180552"/>
+            <a:ext cx="8672567" cy="5519106"/>
             <a:chOff x="474255" y="84207"/>
-            <a:chExt cx="8608447" cy="5180552"/>
+            <a:chExt cx="8672567" cy="5519106"/>
           </a:xfrm>
         </p:grpSpPr>
         <p:sp>
@@ -8529,8 +8529,8 @@
           </p:nvSpPr>
           <p:spPr>
             <a:xfrm>
-              <a:off x="4609338" y="2873999"/>
-              <a:ext cx="672357" cy="2010794"/>
+              <a:off x="4467701" y="2873999"/>
+              <a:ext cx="1119277" cy="2010794"/>
             </a:xfrm>
             <a:prstGeom prst="roundRect">
               <a:avLst/>
@@ -8559,7 +8559,7 @@
               <a:pPr algn="ctr"/>
               <a:r>
                 <a:rPr lang="en-CA" sz="1400" dirty="0"/>
-                <a:t>FHIR &lt;-&gt; X12</a:t>
+                <a:t>FHIR &lt;-&gt; Clearing House or BA or Translation Software</a:t>
               </a:r>
             </a:p>
           </p:txBody>
@@ -8736,10 +8736,10 @@
           </p:nvGrpSpPr>
           <p:grpSpPr>
             <a:xfrm>
-              <a:off x="2959725" y="2751111"/>
-              <a:ext cx="1662842" cy="578287"/>
-              <a:chOff x="2021428" y="2751111"/>
-              <a:chExt cx="1662842" cy="578287"/>
+              <a:off x="2959725" y="2760422"/>
+              <a:ext cx="1649613" cy="568976"/>
+              <a:chOff x="2021428" y="2760422"/>
+              <a:chExt cx="1649613" cy="568976"/>
             </a:xfrm>
           </p:grpSpPr>
           <p:cxnSp>
@@ -8759,7 +8759,7 @@
             <p:spPr>
               <a:xfrm>
                 <a:off x="2021428" y="2991028"/>
-                <a:ext cx="1662842" cy="0"/>
+                <a:ext cx="1505995" cy="0"/>
               </a:xfrm>
               <a:prstGeom prst="straightConnector1">
                 <a:avLst/>
@@ -8797,7 +8797,7 @@
             </p:nvSpPr>
             <p:spPr>
               <a:xfrm>
-                <a:off x="2118969" y="2751111"/>
+                <a:off x="2058845" y="2760422"/>
                 <a:ext cx="1468672" cy="307777"/>
               </a:xfrm>
               <a:prstGeom prst="rect">
@@ -8918,9 +8918,9 @@
           <p:grpSpPr>
             <a:xfrm>
               <a:off x="2963535" y="3497871"/>
-              <a:ext cx="1662842" cy="578287"/>
+              <a:ext cx="1655839" cy="578287"/>
               <a:chOff x="2025238" y="2751111"/>
-              <a:chExt cx="1662842" cy="578287"/>
+              <a:chExt cx="1655839" cy="578287"/>
             </a:xfrm>
           </p:grpSpPr>
           <p:cxnSp>
@@ -8940,7 +8940,7 @@
             <p:spPr>
               <a:xfrm>
                 <a:off x="2025238" y="2991028"/>
-                <a:ext cx="1662842" cy="0"/>
+                <a:ext cx="1504166" cy="0"/>
               </a:xfrm>
               <a:prstGeom prst="straightConnector1">
                 <a:avLst/>
@@ -9114,10 +9114,10 @@
           </p:nvGrpSpPr>
           <p:grpSpPr>
             <a:xfrm>
-              <a:off x="2959725" y="4252251"/>
-              <a:ext cx="1662842" cy="578287"/>
-              <a:chOff x="2021428" y="2751111"/>
-              <a:chExt cx="1662842" cy="578287"/>
+              <a:off x="2959725" y="4213494"/>
+              <a:ext cx="1649613" cy="617044"/>
+              <a:chOff x="2021428" y="2712354"/>
+              <a:chExt cx="1649613" cy="617044"/>
             </a:xfrm>
           </p:grpSpPr>
           <p:cxnSp>
@@ -9137,7 +9137,7 @@
             <p:spPr>
               <a:xfrm>
                 <a:off x="2021428" y="2991028"/>
-                <a:ext cx="1662842" cy="0"/>
+                <a:ext cx="1505995" cy="0"/>
               </a:xfrm>
               <a:prstGeom prst="straightConnector1">
                 <a:avLst/>
@@ -9175,7 +9175,7 @@
             </p:nvSpPr>
             <p:spPr>
               <a:xfrm>
-                <a:off x="2124945" y="2751111"/>
+                <a:off x="2085693" y="2712354"/>
                 <a:ext cx="1468672" cy="307777"/>
               </a:xfrm>
               <a:prstGeom prst="rect">
@@ -9295,10 +9295,10 @@
           </p:nvGrpSpPr>
           <p:grpSpPr>
             <a:xfrm>
-              <a:off x="5281858" y="2747301"/>
-              <a:ext cx="1668619" cy="578287"/>
-              <a:chOff x="2015651" y="2751111"/>
-              <a:chExt cx="1668619" cy="578287"/>
+              <a:off x="5287635" y="2757594"/>
+              <a:ext cx="1662843" cy="577941"/>
+              <a:chOff x="2021428" y="2761404"/>
+              <a:chExt cx="1662843" cy="577941"/>
             </a:xfrm>
           </p:grpSpPr>
           <p:cxnSp>
@@ -9356,7 +9356,7 @@
             </p:nvSpPr>
             <p:spPr>
               <a:xfrm>
-                <a:off x="2017587" y="2751111"/>
+                <a:off x="2280120" y="2761404"/>
                 <a:ext cx="1268296" cy="307777"/>
               </a:xfrm>
               <a:prstGeom prst="rect">
@@ -9397,8 +9397,8 @@
             </p:nvCxnSpPr>
             <p:spPr>
               <a:xfrm flipH="1">
-                <a:off x="2015651" y="3262712"/>
-                <a:ext cx="1668619" cy="0"/>
+                <a:off x="2332602" y="3262712"/>
+                <a:ext cx="1351669" cy="13832"/>
               </a:xfrm>
               <a:prstGeom prst="straightConnector1">
                 <a:avLst/>
@@ -9436,7 +9436,7 @@
             </p:nvSpPr>
             <p:spPr>
               <a:xfrm>
-                <a:off x="2017587" y="3021621"/>
+                <a:off x="2332602" y="3031568"/>
                 <a:ext cx="1163332" cy="307777"/>
               </a:xfrm>
               <a:prstGeom prst="rect">
@@ -9732,10 +9732,10 @@
           </p:nvGrpSpPr>
           <p:grpSpPr>
             <a:xfrm>
-              <a:off x="5278882" y="3473424"/>
-              <a:ext cx="1668619" cy="578287"/>
-              <a:chOff x="2015651" y="2751111"/>
-              <a:chExt cx="1668619" cy="578287"/>
+              <a:off x="5284659" y="3453391"/>
+              <a:ext cx="1662842" cy="599311"/>
+              <a:chOff x="2021428" y="2731078"/>
+              <a:chExt cx="1662842" cy="599311"/>
             </a:xfrm>
           </p:grpSpPr>
           <p:cxnSp>
@@ -9793,7 +9793,7 @@
             </p:nvSpPr>
             <p:spPr>
               <a:xfrm>
-                <a:off x="2017587" y="2751111"/>
+                <a:off x="2489199" y="2731078"/>
                 <a:ext cx="500458" cy="307777"/>
               </a:xfrm>
               <a:prstGeom prst="rect">
@@ -9834,8 +9834,8 @@
             </p:nvCxnSpPr>
             <p:spPr>
               <a:xfrm flipH="1">
-                <a:off x="2015651" y="3262712"/>
-                <a:ext cx="1668619" cy="0"/>
+                <a:off x="2323747" y="3283349"/>
+                <a:ext cx="1314921" cy="0"/>
               </a:xfrm>
               <a:prstGeom prst="straightConnector1">
                 <a:avLst/>
@@ -9873,7 +9873,7 @@
             </p:nvSpPr>
             <p:spPr>
               <a:xfrm>
-                <a:off x="2017587" y="3021621"/>
+                <a:off x="2297804" y="3022612"/>
                 <a:ext cx="1205010" cy="307777"/>
               </a:xfrm>
               <a:prstGeom prst="rect">
@@ -9913,10 +9913,10 @@
           </p:nvGrpSpPr>
           <p:grpSpPr>
             <a:xfrm>
-              <a:off x="5278876" y="4238418"/>
-              <a:ext cx="1668619" cy="578287"/>
-              <a:chOff x="2015651" y="2751111"/>
-              <a:chExt cx="1668619" cy="578287"/>
+              <a:off x="5284653" y="4216040"/>
+              <a:ext cx="1662843" cy="622967"/>
+              <a:chOff x="2021428" y="2728733"/>
+              <a:chExt cx="1662843" cy="622967"/>
             </a:xfrm>
           </p:grpSpPr>
           <p:cxnSp>
@@ -9974,7 +9974,7 @@
             </p:nvSpPr>
             <p:spPr>
               <a:xfrm>
-                <a:off x="2017587" y="2751111"/>
+                <a:off x="2296542" y="2728733"/>
                 <a:ext cx="1268296" cy="307777"/>
               </a:xfrm>
               <a:prstGeom prst="rect">
@@ -9989,18 +9989,13 @@
               <a:lstStyle/>
               <a:p>
                 <a:r>
-                  <a:rPr lang="en-CA" sz="1400">
+                  <a:rPr lang="en-CA" sz="1400" dirty="0">
                     <a:solidFill>
                       <a:srgbClr val="0070C0"/>
                     </a:solidFill>
                   </a:rPr>
                   <a:t>278 and 275(s)</a:t>
                 </a:r>
-                <a:endParaRPr lang="en-CA" sz="1400" dirty="0">
-                  <a:solidFill>
-                    <a:srgbClr val="0070C0"/>
-                  </a:solidFill>
-                </a:endParaRPr>
               </a:p>
             </p:txBody>
           </p:sp>
@@ -10020,8 +10015,8 @@
             </p:nvCxnSpPr>
             <p:spPr>
               <a:xfrm flipH="1">
-                <a:off x="2015651" y="3262712"/>
-                <a:ext cx="1668619" cy="0"/>
+                <a:off x="2323753" y="3262712"/>
+                <a:ext cx="1360518" cy="13832"/>
               </a:xfrm>
               <a:prstGeom prst="straightConnector1">
                 <a:avLst/>
@@ -10059,7 +10054,7 @@
             </p:nvSpPr>
             <p:spPr>
               <a:xfrm>
-                <a:off x="2017587" y="3021621"/>
+                <a:off x="2335584" y="3043923"/>
                 <a:ext cx="1163332" cy="307777"/>
               </a:xfrm>
               <a:prstGeom prst="rect">
@@ -10344,7 +10339,7 @@
           <p:spPr>
             <a:xfrm>
               <a:off x="474255" y="5003149"/>
-              <a:ext cx="8608447" cy="261610"/>
+              <a:ext cx="8672567" cy="600164"/>
             </a:xfrm>
             <a:prstGeom prst="rect">
               <a:avLst/>
@@ -10359,7 +10354,27 @@
             <a:p>
               <a:r>
                 <a:rPr lang="en-CA" sz="1100" dirty="0"/>
-                <a:t>NOTE: final processing entity might receive FHIR rather than X12, so long as an intermediary party has converted data to X12 as part of the process.</a:t>
+                <a:t>NOTE: final processing entity might receive FHIR rather than X12, so long as an intermediary party has converted data to X12 as part of the process.  </a:t>
+              </a:r>
+            </a:p>
+            <a:p>
+              <a:r>
+                <a:rPr lang="en-CA" sz="1100" dirty="0"/>
+                <a:t>In some cases, the X12 portion will be handled entirely within a clearing house.  In those </a:t>
+              </a:r>
+              <a:r>
+                <a:rPr lang="en-CA" sz="1100" dirty="0" err="1"/>
+                <a:t>casles</a:t>
+              </a:r>
+              <a:r>
+                <a:rPr lang="en-CA" sz="1100" dirty="0"/>
+                <a:t>, then 3., 4., 5. will communicate directly with the</a:t>
+              </a:r>
+            </a:p>
+            <a:p>
+              <a:r>
+                <a:rPr lang="en-CA" sz="1100" dirty="0"/>
+                <a:t>Initial and pended PA process.</a:t>
               </a:r>
             </a:p>
           </p:txBody>

</xml_diff>

<commit_message>
Added terminology bindings and a Medical Services example.
</commit_message>
<xml_diff>
--- a/images-source/drawings.pptx
+++ b/images-source/drawings.pptx
@@ -224,7 +224,7 @@
           <a:p>
             <a:fld id="{3D08445B-C90C-48FE-A35E-E6945CACA392}" type="datetimeFigureOut">
               <a:rPr lang="en-US" smtClean="0"/>
-              <a:t>10/13/20</a:t>
+              <a:t>11/3/20</a:t>
             </a:fld>
             <a:endParaRPr lang="en-US" dirty="0"/>
           </a:p>
@@ -10360,15 +10360,7 @@
             <a:p>
               <a:r>
                 <a:rPr lang="en-CA" sz="1100" dirty="0"/>
-                <a:t>In some cases, the X12 portion will be handled entirely within a clearing house.  In those </a:t>
-              </a:r>
-              <a:r>
-                <a:rPr lang="en-CA" sz="1100" dirty="0" err="1"/>
-                <a:t>casles</a:t>
-              </a:r>
-              <a:r>
-                <a:rPr lang="en-CA" sz="1100" dirty="0"/>
-                <a:t>, then 3., 4., 5. will communicate directly with the</a:t>
+                <a:t>In some cases, the X12 portion will be handled entirely within a clearing house.  In those cases, then 3., 4., 5. will communicate directly with the</a:t>
               </a:r>
             </a:p>
             <a:p>

</xml_diff>

<commit_message>
Updated pages based on final publication review.  Made all profile extensions MS.
</commit_message>
<xml_diff>
--- a/images-source/drawings.pptx
+++ b/images-source/drawings.pptx
@@ -224,7 +224,7 @@
           <a:p>
             <a:fld id="{3D08445B-C90C-48FE-A35E-E6945CACA392}" type="datetimeFigureOut">
               <a:rPr lang="en-US" smtClean="0"/>
-              <a:t>11/3/20</a:t>
+              <a:t>11/20/20</a:t>
             </a:fld>
             <a:endParaRPr lang="en-US" dirty="0"/>
           </a:p>
@@ -2869,233 +2869,6 @@
           <a:chExt cx="0" cy="0"/>
         </a:xfrm>
       </p:grpSpPr>
-      <p:sp>
-        <p:nvSpPr>
-          <p:cNvPr id="42" name="Text Placeholder 3">
-            <a:extLst>
-              <a:ext uri="{FF2B5EF4-FFF2-40B4-BE49-F238E27FC236}">
-                <a16:creationId xmlns:a16="http://schemas.microsoft.com/office/drawing/2014/main" id="{DCC1E65A-6457-413B-AB93-754AA1F3658A}"/>
-              </a:ext>
-            </a:extLst>
-          </p:cNvPr>
-          <p:cNvSpPr txBox="1">
-            <a:spLocks/>
-          </p:cNvSpPr>
-          <p:nvPr/>
-        </p:nvSpPr>
-        <p:spPr>
-          <a:xfrm>
-            <a:off x="2495550" y="290807"/>
-            <a:ext cx="9363075" cy="402557"/>
-          </a:xfrm>
-          <a:prstGeom prst="rect">
-            <a:avLst/>
-          </a:prstGeom>
-        </p:spPr>
-        <p:txBody>
-          <a:bodyPr/>
-          <a:lstStyle>
-            <a:lvl1pPr marL="0" indent="0" algn="r" defTabSz="914400" rtl="0" eaLnBrk="1" latinLnBrk="0" hangingPunct="1">
-              <a:lnSpc>
-                <a:spcPts val="2800"/>
-              </a:lnSpc>
-              <a:spcBef>
-                <a:spcPts val="0"/>
-              </a:spcBef>
-              <a:buFont typeface="Arial" panose="020B0604020202020204" pitchFamily="34" charset="0"/>
-              <a:buNone/>
-              <a:defRPr sz="3200" kern="1200">
-                <a:solidFill>
-                  <a:srgbClr val="472005"/>
-                </a:solidFill>
-                <a:latin typeface="+mn-lt"/>
-                <a:ea typeface="+mn-ea"/>
-                <a:cs typeface="+mn-cs"/>
-              </a:defRPr>
-            </a:lvl1pPr>
-            <a:lvl2pPr marL="457200" indent="0" algn="l" defTabSz="914400" rtl="0" eaLnBrk="1" latinLnBrk="0" hangingPunct="1">
-              <a:lnSpc>
-                <a:spcPct val="90000"/>
-              </a:lnSpc>
-              <a:spcBef>
-                <a:spcPts val="500"/>
-              </a:spcBef>
-              <a:buFont typeface="Arial" panose="020B0604020202020204" pitchFamily="34" charset="0"/>
-              <a:buNone/>
-              <a:defRPr sz="2400" kern="1200">
-                <a:solidFill>
-                  <a:schemeClr val="tx1"/>
-                </a:solidFill>
-                <a:latin typeface="+mn-lt"/>
-                <a:ea typeface="+mn-ea"/>
-                <a:cs typeface="+mn-cs"/>
-              </a:defRPr>
-            </a:lvl2pPr>
-            <a:lvl3pPr marL="914400" indent="0" algn="l" defTabSz="914400" rtl="0" eaLnBrk="1" latinLnBrk="0" hangingPunct="1">
-              <a:lnSpc>
-                <a:spcPct val="90000"/>
-              </a:lnSpc>
-              <a:spcBef>
-                <a:spcPts val="500"/>
-              </a:spcBef>
-              <a:buFont typeface="Arial" panose="020B0604020202020204" pitchFamily="34" charset="0"/>
-              <a:buNone/>
-              <a:defRPr sz="2000" kern="1200">
-                <a:solidFill>
-                  <a:schemeClr val="tx1"/>
-                </a:solidFill>
-                <a:latin typeface="+mn-lt"/>
-                <a:ea typeface="+mn-ea"/>
-                <a:cs typeface="+mn-cs"/>
-              </a:defRPr>
-            </a:lvl3pPr>
-            <a:lvl4pPr marL="1371600" indent="0" algn="l" defTabSz="914400" rtl="0" eaLnBrk="1" latinLnBrk="0" hangingPunct="1">
-              <a:lnSpc>
-                <a:spcPct val="90000"/>
-              </a:lnSpc>
-              <a:spcBef>
-                <a:spcPts val="500"/>
-              </a:spcBef>
-              <a:buFont typeface="Arial" panose="020B0604020202020204" pitchFamily="34" charset="0"/>
-              <a:buNone/>
-              <a:defRPr sz="1800" kern="1200">
-                <a:solidFill>
-                  <a:schemeClr val="tx1"/>
-                </a:solidFill>
-                <a:latin typeface="+mn-lt"/>
-                <a:ea typeface="+mn-ea"/>
-                <a:cs typeface="+mn-cs"/>
-              </a:defRPr>
-            </a:lvl4pPr>
-            <a:lvl5pPr marL="1828800" indent="0" algn="l" defTabSz="914400" rtl="0" eaLnBrk="1" latinLnBrk="0" hangingPunct="1">
-              <a:lnSpc>
-                <a:spcPct val="90000"/>
-              </a:lnSpc>
-              <a:spcBef>
-                <a:spcPts val="500"/>
-              </a:spcBef>
-              <a:buFont typeface="Arial" panose="020B0604020202020204" pitchFamily="34" charset="0"/>
-              <a:buNone/>
-              <a:defRPr sz="1800" kern="1200">
-                <a:solidFill>
-                  <a:schemeClr val="tx1"/>
-                </a:solidFill>
-                <a:latin typeface="+mn-lt"/>
-                <a:ea typeface="+mn-ea"/>
-                <a:cs typeface="+mn-cs"/>
-              </a:defRPr>
-            </a:lvl5pPr>
-            <a:lvl6pPr marL="2514600" indent="-228600" algn="l" defTabSz="914400" rtl="0" eaLnBrk="1" latinLnBrk="0" hangingPunct="1">
-              <a:lnSpc>
-                <a:spcPct val="90000"/>
-              </a:lnSpc>
-              <a:spcBef>
-                <a:spcPts val="500"/>
-              </a:spcBef>
-              <a:buFont typeface="Arial" panose="020B0604020202020204" pitchFamily="34" charset="0"/>
-              <a:buChar char="•"/>
-              <a:defRPr sz="1800" kern="1200">
-                <a:solidFill>
-                  <a:schemeClr val="tx1"/>
-                </a:solidFill>
-                <a:latin typeface="+mn-lt"/>
-                <a:ea typeface="+mn-ea"/>
-                <a:cs typeface="+mn-cs"/>
-              </a:defRPr>
-            </a:lvl6pPr>
-            <a:lvl7pPr marL="2971800" indent="-228600" algn="l" defTabSz="914400" rtl="0" eaLnBrk="1" latinLnBrk="0" hangingPunct="1">
-              <a:lnSpc>
-                <a:spcPct val="90000"/>
-              </a:lnSpc>
-              <a:spcBef>
-                <a:spcPts val="500"/>
-              </a:spcBef>
-              <a:buFont typeface="Arial" panose="020B0604020202020204" pitchFamily="34" charset="0"/>
-              <a:buChar char="•"/>
-              <a:defRPr sz="1800" kern="1200">
-                <a:solidFill>
-                  <a:schemeClr val="tx1"/>
-                </a:solidFill>
-                <a:latin typeface="+mn-lt"/>
-                <a:ea typeface="+mn-ea"/>
-                <a:cs typeface="+mn-cs"/>
-              </a:defRPr>
-            </a:lvl7pPr>
-            <a:lvl8pPr marL="3429000" indent="-228600" algn="l" defTabSz="914400" rtl="0" eaLnBrk="1" latinLnBrk="0" hangingPunct="1">
-              <a:lnSpc>
-                <a:spcPct val="90000"/>
-              </a:lnSpc>
-              <a:spcBef>
-                <a:spcPts val="500"/>
-              </a:spcBef>
-              <a:buFont typeface="Arial" panose="020B0604020202020204" pitchFamily="34" charset="0"/>
-              <a:buChar char="•"/>
-              <a:defRPr sz="1800" kern="1200">
-                <a:solidFill>
-                  <a:schemeClr val="tx1"/>
-                </a:solidFill>
-                <a:latin typeface="+mn-lt"/>
-                <a:ea typeface="+mn-ea"/>
-                <a:cs typeface="+mn-cs"/>
-              </a:defRPr>
-            </a:lvl8pPr>
-            <a:lvl9pPr marL="3886200" indent="-228600" algn="l" defTabSz="914400" rtl="0" eaLnBrk="1" latinLnBrk="0" hangingPunct="1">
-              <a:lnSpc>
-                <a:spcPct val="90000"/>
-              </a:lnSpc>
-              <a:spcBef>
-                <a:spcPts val="500"/>
-              </a:spcBef>
-              <a:buFont typeface="Arial" panose="020B0604020202020204" pitchFamily="34" charset="0"/>
-              <a:buChar char="•"/>
-              <a:defRPr sz="1800" kern="1200">
-                <a:solidFill>
-                  <a:schemeClr val="tx1"/>
-                </a:solidFill>
-                <a:latin typeface="+mn-lt"/>
-                <a:ea typeface="+mn-ea"/>
-                <a:cs typeface="+mn-cs"/>
-              </a:defRPr>
-            </a:lvl9pPr>
-          </a:lstStyle>
-          <a:p>
-            <a:pPr marL="0" marR="0" lvl="0" indent="0" algn="r" defTabSz="914400" rtl="0" eaLnBrk="1" fontAlgn="auto" latinLnBrk="0" hangingPunct="1">
-              <a:lnSpc>
-                <a:spcPts val="2800"/>
-              </a:lnSpc>
-              <a:spcBef>
-                <a:spcPts val="0"/>
-              </a:spcBef>
-              <a:spcAft>
-                <a:spcPts val="0"/>
-              </a:spcAft>
-              <a:buClrTx/>
-              <a:buSzTx/>
-              <a:buFont typeface="Arial" panose="020B0604020202020204" pitchFamily="34" charset="0"/>
-              <a:buNone/>
-              <a:tabLst/>
-              <a:defRPr/>
-            </a:pPr>
-            <a:r>
-              <a:rPr kumimoji="0" lang="en-US" sz="3200" b="0" i="0" u="none" strike="noStrike" kern="1200" cap="none" spc="0" normalizeH="0" baseline="0" noProof="0" dirty="0">
-                <a:ln>
-                  <a:noFill/>
-                </a:ln>
-                <a:solidFill>
-                  <a:srgbClr val="472005"/>
-                </a:solidFill>
-                <a:effectLst/>
-                <a:uLnTx/>
-                <a:uFillTx/>
-                <a:latin typeface="Calibri" panose="020F0502020204030204"/>
-                <a:ea typeface="+mn-ea"/>
-                <a:cs typeface="+mn-cs"/>
-              </a:rPr>
-              <a:t>PAS-architecture</a:t>
-            </a:r>
-          </a:p>
-        </p:txBody>
-      </p:sp>
       <p:grpSp>
         <p:nvGrpSpPr>
           <p:cNvPr id="20" name="Group 19">
@@ -6032,31 +5805,6 @@
           </p:style>
         </p:cxnSp>
       </p:grpSp>
-      <p:sp>
-        <p:nvSpPr>
-          <p:cNvPr id="9" name="Text Placeholder 8">
-            <a:extLst>
-              <a:ext uri="{FF2B5EF4-FFF2-40B4-BE49-F238E27FC236}">
-                <a16:creationId xmlns:a16="http://schemas.microsoft.com/office/drawing/2014/main" id="{6B0425C5-10E4-42E5-80B8-E2188F02CA38}"/>
-              </a:ext>
-            </a:extLst>
-          </p:cNvPr>
-          <p:cNvSpPr>
-            <a:spLocks noGrp="1"/>
-          </p:cNvSpPr>
-          <p:nvPr>
-            <p:ph type="body" sz="quarter" idx="13"/>
-          </p:nvPr>
-        </p:nvSpPr>
-        <p:spPr/>
-        <p:txBody>
-          <a:bodyPr/>
-          <a:lstStyle/>
-          <a:p>
-            <a:endParaRPr lang="en-CA"/>
-          </a:p>
-        </p:txBody>
-      </p:sp>
     </p:spTree>
     <p:extLst>
       <p:ext uri="{BB962C8B-B14F-4D97-AF65-F5344CB8AC3E}">
@@ -6114,41 +5862,6 @@
               <a:t>3</a:t>
             </a:fld>
             <a:endParaRPr lang="en-US" dirty="0"/>
-          </a:p>
-        </p:txBody>
-      </p:sp>
-      <p:sp>
-        <p:nvSpPr>
-          <p:cNvPr id="4" name="Text Placeholder 3">
-            <a:extLst>
-              <a:ext uri="{FF2B5EF4-FFF2-40B4-BE49-F238E27FC236}">
-                <a16:creationId xmlns:a16="http://schemas.microsoft.com/office/drawing/2014/main" id="{0AB7D4BB-13A7-4B73-ACB6-C321A15A2B72}"/>
-              </a:ext>
-            </a:extLst>
-          </p:cNvPr>
-          <p:cNvSpPr>
-            <a:spLocks noGrp="1"/>
-          </p:cNvSpPr>
-          <p:nvPr>
-            <p:ph type="body" sz="quarter" idx="13"/>
-          </p:nvPr>
-        </p:nvSpPr>
-        <p:spPr/>
-        <p:txBody>
-          <a:bodyPr/>
-          <a:lstStyle/>
-          <a:p>
-            <a:r>
-              <a:rPr lang="en-US" dirty="0">
-                <a:solidFill>
-                  <a:schemeClr val="tx1">
-                    <a:lumMod val="65000"/>
-                    <a:lumOff val="35000"/>
-                  </a:schemeClr>
-                </a:solidFill>
-              </a:rPr>
-              <a:t>pa-stack</a:t>
-            </a:r>
           </a:p>
         </p:txBody>
       </p:sp>
@@ -7846,7 +7559,7 @@
                 <a:defRPr/>
               </a:pPr>
               <a:r>
-                <a:rPr kumimoji="0" lang="en-US" sz="1400" b="1" i="0" u="none" strike="noStrike" kern="0" cap="none" spc="0" normalizeH="0" baseline="0" noProof="0">
+                <a:rPr kumimoji="0" lang="en-US" sz="1400" b="1" i="0" u="none" strike="noStrike" kern="0" cap="none" spc="0" normalizeH="0" baseline="0" noProof="0" dirty="0">
                   <a:ln>
                     <a:noFill/>
                   </a:ln>
@@ -7861,6 +7574,34 @@
                   <a:cs typeface="+mn-cs"/>
                 </a:rPr>
                 <a:t>X12 275</a:t>
+              </a:r>
+            </a:p>
+            <a:p>
+              <a:pPr marL="0" marR="0" lvl="0" indent="0" algn="ctr" defTabSz="914400" eaLnBrk="1" fontAlgn="auto" latinLnBrk="0" hangingPunct="1">
+                <a:lnSpc>
+                  <a:spcPct val="100000"/>
+                </a:lnSpc>
+                <a:spcBef>
+                  <a:spcPts val="0"/>
+                </a:spcBef>
+                <a:spcAft>
+                  <a:spcPts val="0"/>
+                </a:spcAft>
+                <a:buClrTx/>
+                <a:buSzTx/>
+                <a:buFontTx/>
+                <a:buNone/>
+                <a:tabLst/>
+                <a:defRPr/>
+              </a:pPr>
+              <a:r>
+                <a:rPr lang="en-US" sz="1400" b="1" kern="0" dirty="0">
+                  <a:solidFill>
+                    <a:prstClr val="black"/>
+                  </a:solidFill>
+                  <a:latin typeface="Calibri" panose="020F0502020204030204"/>
+                </a:rPr>
+                <a:t>Or alternate exchange method</a:t>
               </a:r>
               <a:endParaRPr kumimoji="0" lang="en-US" sz="1400" b="1" i="0" u="none" strike="noStrike" kern="0" cap="none" spc="0" normalizeH="0" baseline="0" noProof="0" dirty="0">
                 <a:ln>
@@ -7974,7 +7715,7 @@
           </p:nvSpPr>
           <p:spPr>
             <a:xfrm>
-              <a:off x="1560858" y="4382093"/>
+              <a:off x="1560859" y="4382093"/>
               <a:ext cx="1436967" cy="502699"/>
             </a:xfrm>
             <a:prstGeom prst="roundRect">
@@ -8001,6 +7742,7 @@
             <a:bodyPr rtlCol="0" anchor="ctr"/>
             <a:lstStyle/>
             <a:p>
+              <a:pPr algn="ctr"/>
               <a:r>
                 <a:rPr lang="en-CA" sz="1400" dirty="0"/>
                 <a:t>5. Adjust</a:t>
@@ -8029,8 +7771,8 @@
           </p:nvSpPr>
           <p:spPr>
             <a:xfrm>
-              <a:off x="1560859" y="3628045"/>
-              <a:ext cx="1436966" cy="502699"/>
+              <a:off x="1560859" y="3518303"/>
+              <a:ext cx="1436966" cy="702182"/>
             </a:xfrm>
             <a:prstGeom prst="roundRect">
               <a:avLst/>
@@ -8056,16 +7798,24 @@
             <a:bodyPr rtlCol="0" anchor="ctr"/>
             <a:lstStyle/>
             <a:p>
+              <a:pPr algn="ctr"/>
               <a:r>
-                <a:rPr lang="en-CA" sz="1400" dirty="0"/>
+                <a:rPr lang="en-CA" sz="1200" dirty="0"/>
                 <a:t>4. Monitor for</a:t>
               </a:r>
               <a:br>
-                <a:rPr lang="en-CA" sz="1400" dirty="0"/>
+                <a:rPr lang="en-CA" sz="1200" dirty="0"/>
               </a:br>
               <a:r>
-                <a:rPr lang="en-CA" sz="1400" dirty="0"/>
+                <a:rPr lang="en-CA" sz="1200" dirty="0"/>
                 <a:t>    Updates</a:t>
+              </a:r>
+            </a:p>
+            <a:p>
+              <a:pPr algn="ctr"/>
+              <a:r>
+                <a:rPr lang="en-CA" sz="1200" dirty="0"/>
+                <a:t>(polling or subscription)</a:t>
               </a:r>
             </a:p>
           </p:txBody>
@@ -8084,8 +7834,8 @@
           </p:nvSpPr>
           <p:spPr>
             <a:xfrm>
-              <a:off x="1560858" y="2873998"/>
-              <a:ext cx="1436967" cy="502698"/>
+              <a:off x="1550176" y="2873998"/>
+              <a:ext cx="1447649" cy="502698"/>
             </a:xfrm>
             <a:prstGeom prst="roundRect">
               <a:avLst/>
@@ -8111,6 +7861,7 @@
             <a:bodyPr rtlCol="0" anchor="ctr"/>
             <a:lstStyle/>
             <a:p>
+              <a:pPr algn="ctr"/>
               <a:r>
                 <a:rPr lang="en-CA" sz="1400" dirty="0"/>
                 <a:t>3. Submit PA</a:t>
@@ -8306,8 +8057,8 @@
           </p:nvCxnSpPr>
           <p:spPr>
             <a:xfrm flipH="1">
-              <a:off x="2279342" y="2258092"/>
-              <a:ext cx="4" cy="615906"/>
+              <a:off x="2274001" y="2258092"/>
+              <a:ext cx="5345" cy="615906"/>
             </a:xfrm>
             <a:prstGeom prst="straightConnector1">
               <a:avLst/>
@@ -8348,13 +8099,13 @@
             <p:nvPr/>
           </p:nvCxnSpPr>
           <p:spPr>
-            <a:xfrm rot="10800000" flipH="1">
-              <a:off x="1560857" y="3879395"/>
-              <a:ext cx="1" cy="754048"/>
+            <a:xfrm rot="10800000">
+              <a:off x="1560859" y="3869395"/>
+              <a:ext cx="12700" cy="764049"/>
             </a:xfrm>
             <a:prstGeom prst="bentConnector3">
               <a:avLst>
-                <a:gd name="adj1" fmla="val -22860000000"/>
+                <a:gd name="adj1" fmla="val 1800000"/>
               </a:avLst>
             </a:prstGeom>
             <a:ln>
@@ -8394,8 +8145,8 @@
           </p:nvCxnSpPr>
           <p:spPr>
             <a:xfrm>
-              <a:off x="2279342" y="3376696"/>
-              <a:ext cx="0" cy="251349"/>
+              <a:off x="2274001" y="3376696"/>
+              <a:ext cx="5341" cy="141607"/>
             </a:xfrm>
             <a:prstGeom prst="straightConnector1">
               <a:avLst/>
@@ -8437,8 +8188,8 @@
           </p:nvCxnSpPr>
           <p:spPr>
             <a:xfrm>
-              <a:off x="2279342" y="4130744"/>
-              <a:ext cx="0" cy="251349"/>
+              <a:off x="2279342" y="4220485"/>
+              <a:ext cx="1" cy="161608"/>
             </a:xfrm>
             <a:prstGeom prst="straightConnector1">
               <a:avLst/>

</xml_diff>

<commit_message>
Make changes for STU1.2 ballot
</commit_message>
<xml_diff>
--- a/images-source/drawings.pptx
+++ b/images-source/drawings.pptx
@@ -224,7 +224,7 @@
           <a:p>
             <a:fld id="{3D08445B-C90C-48FE-A35E-E6945CACA392}" type="datetimeFigureOut">
               <a:rPr lang="en-US" smtClean="0"/>
-              <a:t>11/20/20</a:t>
+              <a:t>2/15/22</a:t>
             </a:fld>
             <a:endParaRPr lang="en-US" dirty="0"/>
           </a:p>
@@ -7696,9 +7696,9 @@
         <p:grpSpPr>
           <a:xfrm>
             <a:off x="474255" y="84207"/>
-            <a:ext cx="8672567" cy="5519106"/>
+            <a:ext cx="9089348" cy="5949993"/>
             <a:chOff x="474255" y="84207"/>
-            <a:chExt cx="8672567" cy="5519106"/>
+            <a:chExt cx="9089348" cy="5949993"/>
           </a:xfrm>
         </p:grpSpPr>
         <p:sp>
@@ -10090,7 +10090,7 @@
           <p:spPr>
             <a:xfrm>
               <a:off x="474255" y="5003149"/>
-              <a:ext cx="8672567" cy="600164"/>
+              <a:ext cx="9089348" cy="1031051"/>
             </a:xfrm>
             <a:prstGeom prst="rect">
               <a:avLst/>
@@ -10105,20 +10105,59 @@
             <a:p>
               <a:r>
                 <a:rPr lang="en-CA" sz="1100" dirty="0"/>
-                <a:t>NOTE: final processing entity might receive FHIR rather than X12, so long as an intermediary party has converted data to X12 as part of the process.  </a:t>
+                <a:t>NOTES:</a:t>
               </a:r>
             </a:p>
             <a:p>
+              <a:pPr marL="342900" lvl="0" indent="-342900">
+                <a:buFont typeface="+mj-lt"/>
+                <a:buAutoNum type="arabicPeriod"/>
+              </a:pPr>
               <a:r>
-                <a:rPr lang="en-CA" sz="1100" dirty="0"/>
-                <a:t>In some cases, the X12 portion will be handled entirely within a clearing house.  In those cases, then 3., 4., 5. will communicate directly with the</a:t>
+                <a:rPr lang="en-US" sz="1000" dirty="0"/>
+                <a:t>The intermediary SHALL always exchange a FHIR bundle with the EHR (on left in the drawing above)</a:t>
               </a:r>
+              <a:endParaRPr lang="en-CA" sz="1000" dirty="0"/>
             </a:p>
             <a:p>
+              <a:pPr marL="342900" lvl="0" indent="-342900">
+                <a:buFont typeface="+mj-lt"/>
+                <a:buAutoNum type="arabicPeriod"/>
+              </a:pPr>
               <a:r>
-                <a:rPr lang="en-CA" sz="1100" dirty="0"/>
-                <a:t>Initial and pended PA process.</a:t>
+                <a:rPr lang="en-US" sz="1000" dirty="0"/>
+                <a:t>The intermediary SHALL convert the FHIR bundle to and from an X12 278 (and optionally to an X12 275) if necessary to meet the HIPAA  transaction requirements.  </a:t>
               </a:r>
+              <a:endParaRPr lang="en-CA" sz="1000" dirty="0"/>
+            </a:p>
+            <a:p>
+              <a:pPr marL="342900" lvl="0" indent="-342900">
+                <a:buFont typeface="+mj-lt"/>
+                <a:buAutoNum type="arabicPeriod"/>
+              </a:pPr>
+              <a:r>
+                <a:rPr lang="en-US" sz="1000" dirty="0"/>
+                <a:t>The intermediary is responsible for obtaining a status of the PA request from the Payer (may use the X12 278i) when requested by the EHR.</a:t>
+              </a:r>
+              <a:endParaRPr lang="en-CA" sz="1000" dirty="0"/>
+            </a:p>
+            <a:p>
+              <a:pPr marL="342900" lvl="0" indent="-342900">
+                <a:buFont typeface="+mj-lt"/>
+                <a:buAutoNum type="arabicPeriod"/>
+              </a:pPr>
+              <a:r>
+                <a:rPr lang="en-US" sz="1000" dirty="0"/>
+                <a:t>The intermediary MAY convert the X12 278 to and from a FHIR bundle and exchange it with a payer as long as the PA request and response are in an X12 278 format</a:t>
+              </a:r>
+              <a:br>
+                <a:rPr lang="en-US" sz="1000" dirty="0"/>
+              </a:br>
+              <a:r>
+                <a:rPr lang="en-US" sz="1000" dirty="0"/>
+                <a:t> at some time between the exchange with the HER  and the payer.</a:t>
+              </a:r>
+              <a:endParaRPr lang="en-CA" sz="1000" dirty="0"/>
             </a:p>
           </p:txBody>
         </p:sp>

</xml_diff>

<commit_message>
Initial commits for 1.3
</commit_message>
<xml_diff>
--- a/images-source/drawings.pptx
+++ b/images-source/drawings.pptx
@@ -224,7 +224,7 @@
           <a:p>
             <a:fld id="{3D08445B-C90C-48FE-A35E-E6945CACA392}" type="datetimeFigureOut">
               <a:rPr lang="en-US" smtClean="0"/>
-              <a:t>2/15/22</a:t>
+              <a:t>3/9/23</a:t>
             </a:fld>
             <a:endParaRPr lang="en-US" dirty="0"/>
           </a:p>
@@ -7695,10 +7695,10 @@
         </p:nvGrpSpPr>
         <p:grpSpPr>
           <a:xfrm>
-            <a:off x="474255" y="84207"/>
-            <a:ext cx="9089348" cy="5949993"/>
-            <a:chOff x="474255" y="84207"/>
-            <a:chExt cx="9089348" cy="5949993"/>
+            <a:off x="909811" y="84207"/>
+            <a:ext cx="7594691" cy="4910042"/>
+            <a:chOff x="909811" y="84207"/>
+            <a:chExt cx="7594691" cy="4910042"/>
           </a:xfrm>
         </p:grpSpPr>
         <p:sp>
@@ -10075,92 +10075,6 @@
             </a:p>
           </p:txBody>
         </p:sp>
-        <p:sp>
-          <p:nvSpPr>
-            <p:cNvPr id="122" name="TextBox 121">
-              <a:extLst>
-                <a:ext uri="{FF2B5EF4-FFF2-40B4-BE49-F238E27FC236}">
-                  <a16:creationId xmlns:a16="http://schemas.microsoft.com/office/drawing/2014/main" id="{534C02A5-38AC-4E42-9EC7-AABA048D34CA}"/>
-                </a:ext>
-              </a:extLst>
-            </p:cNvPr>
-            <p:cNvSpPr txBox="1"/>
-            <p:nvPr/>
-          </p:nvSpPr>
-          <p:spPr>
-            <a:xfrm>
-              <a:off x="474255" y="5003149"/>
-              <a:ext cx="9089348" cy="1031051"/>
-            </a:xfrm>
-            <a:prstGeom prst="rect">
-              <a:avLst/>
-            </a:prstGeom>
-            <a:noFill/>
-          </p:spPr>
-          <p:txBody>
-            <a:bodyPr wrap="none" rtlCol="0">
-              <a:spAutoFit/>
-            </a:bodyPr>
-            <a:lstStyle/>
-            <a:p>
-              <a:r>
-                <a:rPr lang="en-CA" sz="1100" dirty="0"/>
-                <a:t>NOTES:</a:t>
-              </a:r>
-            </a:p>
-            <a:p>
-              <a:pPr marL="342900" lvl="0" indent="-342900">
-                <a:buFont typeface="+mj-lt"/>
-                <a:buAutoNum type="arabicPeriod"/>
-              </a:pPr>
-              <a:r>
-                <a:rPr lang="en-US" sz="1000" dirty="0"/>
-                <a:t>The intermediary SHALL always exchange a FHIR bundle with the EHR (on left in the drawing above)</a:t>
-              </a:r>
-              <a:endParaRPr lang="en-CA" sz="1000" dirty="0"/>
-            </a:p>
-            <a:p>
-              <a:pPr marL="342900" lvl="0" indent="-342900">
-                <a:buFont typeface="+mj-lt"/>
-                <a:buAutoNum type="arabicPeriod"/>
-              </a:pPr>
-              <a:r>
-                <a:rPr lang="en-US" sz="1000" dirty="0"/>
-                <a:t>The intermediary SHALL convert the FHIR bundle to and from an X12 278 (and optionally to an X12 275) if necessary to meet the HIPAA  transaction requirements.  </a:t>
-              </a:r>
-              <a:endParaRPr lang="en-CA" sz="1000" dirty="0"/>
-            </a:p>
-            <a:p>
-              <a:pPr marL="342900" lvl="0" indent="-342900">
-                <a:buFont typeface="+mj-lt"/>
-                <a:buAutoNum type="arabicPeriod"/>
-              </a:pPr>
-              <a:r>
-                <a:rPr lang="en-US" sz="1000" dirty="0"/>
-                <a:t>The intermediary is responsible for obtaining a status of the PA request from the Payer (may use the X12 278i) when requested by the EHR.</a:t>
-              </a:r>
-              <a:endParaRPr lang="en-CA" sz="1000" dirty="0"/>
-            </a:p>
-            <a:p>
-              <a:pPr marL="342900" lvl="0" indent="-342900">
-                <a:buFont typeface="+mj-lt"/>
-                <a:buAutoNum type="arabicPeriod"/>
-              </a:pPr>
-              <a:r>
-                <a:rPr lang="en-US" sz="1000" dirty="0"/>
-                <a:t>The intermediary MAY convert the X12 278 to and from a FHIR bundle and exchange it with a payer as long as the PA request and response are in an X12 278 format</a:t>
-              </a:r>
-              <a:br>
-                <a:rPr lang="en-US" sz="1000" dirty="0"/>
-              </a:br>
-              <a:r>
-                <a:rPr lang="en-US" sz="1000" dirty="0"/>
-                <a:t> at some time between the exchange with the HER  and the payer.</a:t>
-              </a:r>
-              <a:endParaRPr lang="en-CA" sz="1000" dirty="0"/>
-            </a:p>
-          </p:txBody>
-        </p:sp>
       </p:grpSp>
     </p:spTree>
     <p:extLst>

</xml_diff>

<commit_message>
More fixes due to ballot comments.
</commit_message>
<xml_diff>
--- a/images-source/drawings.pptx
+++ b/images-source/drawings.pptx
@@ -224,7 +224,7 @@
           <a:p>
             <a:fld id="{3D08445B-C90C-48FE-A35E-E6945CACA392}" type="datetimeFigureOut">
               <a:rPr lang="en-US" smtClean="0"/>
-              <a:t>3/9/23</a:t>
+              <a:t>5/29/23</a:t>
             </a:fld>
             <a:endParaRPr lang="en-US" dirty="0"/>
           </a:p>
@@ -10218,7 +10218,7 @@
         </p:nvGrpSpPr>
         <p:grpSpPr>
           <a:xfrm>
-            <a:off x="1550504" y="3568700"/>
+            <a:off x="1550504" y="3469447"/>
             <a:ext cx="3213100" cy="2246796"/>
             <a:chOff x="1550504" y="3568700"/>
             <a:chExt cx="3213100" cy="2246796"/>
@@ -10725,6 +10725,56 @@
           </p:txBody>
         </p:sp>
       </p:grpSp>
+      <p:sp>
+        <p:nvSpPr>
+          <p:cNvPr id="3" name="Rounded Rectangle 2">
+            <a:extLst>
+              <a:ext uri="{FF2B5EF4-FFF2-40B4-BE49-F238E27FC236}">
+                <a16:creationId xmlns:a16="http://schemas.microsoft.com/office/drawing/2014/main" id="{DD96CF43-82E6-7BC5-C299-CB4FF34244DE}"/>
+              </a:ext>
+            </a:extLst>
+          </p:cNvPr>
+          <p:cNvSpPr/>
+          <p:nvPr/>
+        </p:nvSpPr>
+        <p:spPr>
+          <a:xfrm>
+            <a:off x="1578251" y="5779467"/>
+            <a:ext cx="3194602" cy="440634"/>
+          </a:xfrm>
+          <a:prstGeom prst="roundRect">
+            <a:avLst/>
+          </a:prstGeom>
+        </p:spPr>
+        <p:style>
+          <a:lnRef idx="2">
+            <a:schemeClr val="accent2">
+              <a:shade val="50000"/>
+            </a:schemeClr>
+          </a:lnRef>
+          <a:fillRef idx="1">
+            <a:schemeClr val="accent2"/>
+          </a:fillRef>
+          <a:effectRef idx="0">
+            <a:schemeClr val="accent2"/>
+          </a:effectRef>
+          <a:fontRef idx="minor">
+            <a:schemeClr val="lt1"/>
+          </a:fontRef>
+        </p:style>
+        <p:txBody>
+          <a:bodyPr rtlCol="0" anchor="ctr"/>
+          <a:lstStyle/>
+          <a:p>
+            <a:pPr algn="ctr"/>
+            <a:r>
+              <a:rPr lang="en-US" dirty="0" err="1"/>
+              <a:t>DocumentReference</a:t>
+            </a:r>
+            <a:endParaRPr lang="en-US" dirty="0"/>
+          </a:p>
+        </p:txBody>
+      </p:sp>
     </p:spTree>
     <p:extLst>
       <p:ext uri="{BB962C8B-B14F-4D97-AF65-F5344CB8AC3E}">

</xml_diff>

<commit_message>
Updates due to JIRA issues.
</commit_message>
<xml_diff>
--- a/images-source/drawings.pptx
+++ b/images-source/drawings.pptx
@@ -224,7 +224,7 @@
           <a:p>
             <a:fld id="{3D08445B-C90C-48FE-A35E-E6945CACA392}" type="datetimeFigureOut">
               <a:rPr lang="en-US" smtClean="0"/>
-              <a:t>5/29/23</a:t>
+              <a:t>9/9/24</a:t>
             </a:fld>
             <a:endParaRPr lang="en-US" dirty="0"/>
           </a:p>
@@ -7815,7 +7815,7 @@
               <a:pPr algn="ctr"/>
               <a:r>
                 <a:rPr lang="en-CA" sz="1200" dirty="0"/>
-                <a:t>(polling or subscription)</a:t>
+                <a:t>(subscription)</a:t>
               </a:r>
             </a:p>
           </p:txBody>

</xml_diff>